<commit_message>
Update 2.7 and 2.8 Documentation Template 1.pptx
</commit_message>
<xml_diff>
--- a/2.7 and 2.8 Documentation Template 1.pptx
+++ b/2.7 and 2.8 Documentation Template 1.pptx
@@ -158,7 +158,7 @@
   <pc:docChgLst>
     <pc:chgData name="Elme Pieterse" userId="cf235864-f06d-4d9c-a838-9d693a8e3248" providerId="ADAL" clId="{44400E0D-F01E-4C52-8DFE-33262DF1F20E}"/>
     <pc:docChg chg="undo redo custSel addSld delSld modSld sldOrd">
-      <pc:chgData name="Elme Pieterse" userId="cf235864-f06d-4d9c-a838-9d693a8e3248" providerId="ADAL" clId="{44400E0D-F01E-4C52-8DFE-33262DF1F20E}" dt="2024-04-10T08:17:50.630" v="3848" actId="20577"/>
+      <pc:chgData name="Elme Pieterse" userId="cf235864-f06d-4d9c-a838-9d693a8e3248" providerId="ADAL" clId="{44400E0D-F01E-4C52-8DFE-33262DF1F20E}" dt="2024-04-10T23:35:16.227" v="4085" actId="1037"/>
       <pc:docMkLst>
         <pc:docMk/>
       </pc:docMkLst>
@@ -2012,13 +2012,13 @@
         </pc:sldMkLst>
       </pc:sldChg>
       <pc:sldChg chg="addSp delSp modSp add mod ord">
-        <pc:chgData name="Elme Pieterse" userId="cf235864-f06d-4d9c-a838-9d693a8e3248" providerId="ADAL" clId="{44400E0D-F01E-4C52-8DFE-33262DF1F20E}" dt="2024-04-10T08:17:39.878" v="3830" actId="1036"/>
+        <pc:chgData name="Elme Pieterse" userId="cf235864-f06d-4d9c-a838-9d693a8e3248" providerId="ADAL" clId="{44400E0D-F01E-4C52-8DFE-33262DF1F20E}" dt="2024-04-10T23:35:16.227" v="4085" actId="1037"/>
         <pc:sldMkLst>
           <pc:docMk/>
           <pc:sldMk cId="10480317" sldId="289"/>
         </pc:sldMkLst>
         <pc:spChg chg="mod">
-          <ac:chgData name="Elme Pieterse" userId="cf235864-f06d-4d9c-a838-9d693a8e3248" providerId="ADAL" clId="{44400E0D-F01E-4C52-8DFE-33262DF1F20E}" dt="2024-04-10T07:18:09.233" v="3797" actId="20577"/>
+          <ac:chgData name="Elme Pieterse" userId="cf235864-f06d-4d9c-a838-9d693a8e3248" providerId="ADAL" clId="{44400E0D-F01E-4C52-8DFE-33262DF1F20E}" dt="2024-04-10T23:34:52.490" v="3987" actId="403"/>
           <ac:spMkLst>
             <pc:docMk/>
             <pc:sldMk cId="10480317" sldId="289"/>
@@ -2082,7 +2082,7 @@
           </ac:graphicFrameMkLst>
         </pc:graphicFrameChg>
         <pc:graphicFrameChg chg="add mod modGraphic">
-          <ac:chgData name="Elme Pieterse" userId="cf235864-f06d-4d9c-a838-9d693a8e3248" providerId="ADAL" clId="{44400E0D-F01E-4C52-8DFE-33262DF1F20E}" dt="2024-04-10T08:17:39.878" v="3830" actId="1036"/>
+          <ac:chgData name="Elme Pieterse" userId="cf235864-f06d-4d9c-a838-9d693a8e3248" providerId="ADAL" clId="{44400E0D-F01E-4C52-8DFE-33262DF1F20E}" dt="2024-04-10T23:25:48.565" v="3943" actId="14734"/>
           <ac:graphicFrameMkLst>
             <pc:docMk/>
             <pc:sldMk cId="10480317" sldId="289"/>
@@ -2090,7 +2090,7 @@
           </ac:graphicFrameMkLst>
         </pc:graphicFrameChg>
         <pc:graphicFrameChg chg="add mod modGraphic">
-          <ac:chgData name="Elme Pieterse" userId="cf235864-f06d-4d9c-a838-9d693a8e3248" providerId="ADAL" clId="{44400E0D-F01E-4C52-8DFE-33262DF1F20E}" dt="2024-04-10T08:17:39.878" v="3830" actId="1036"/>
+          <ac:chgData name="Elme Pieterse" userId="cf235864-f06d-4d9c-a838-9d693a8e3248" providerId="ADAL" clId="{44400E0D-F01E-4C52-8DFE-33262DF1F20E}" dt="2024-04-10T23:25:42.334" v="3941" actId="14734"/>
           <ac:graphicFrameMkLst>
             <pc:docMk/>
             <pc:sldMk cId="10480317" sldId="289"/>
@@ -2098,7 +2098,7 @@
           </ac:graphicFrameMkLst>
         </pc:graphicFrameChg>
         <pc:graphicFrameChg chg="add del mod modGraphic">
-          <ac:chgData name="Elme Pieterse" userId="cf235864-f06d-4d9c-a838-9d693a8e3248" providerId="ADAL" clId="{44400E0D-F01E-4C52-8DFE-33262DF1F20E}" dt="2024-04-10T08:17:39.878" v="3830" actId="1036"/>
+          <ac:chgData name="Elme Pieterse" userId="cf235864-f06d-4d9c-a838-9d693a8e3248" providerId="ADAL" clId="{44400E0D-F01E-4C52-8DFE-33262DF1F20E}" dt="2024-04-10T23:26:08.984" v="3947" actId="14100"/>
           <ac:graphicFrameMkLst>
             <pc:docMk/>
             <pc:sldMk cId="10480317" sldId="289"/>
@@ -2111,6 +2111,62 @@
             <pc:docMk/>
             <pc:sldMk cId="10480317" sldId="289"/>
             <ac:picMk id="6" creationId="{9DAE2B4B-0530-C3FC-88AC-C1D33E6078B9}"/>
+          </ac:picMkLst>
+        </pc:picChg>
+        <pc:picChg chg="add mod">
+          <ac:chgData name="Elme Pieterse" userId="cf235864-f06d-4d9c-a838-9d693a8e3248" providerId="ADAL" clId="{44400E0D-F01E-4C52-8DFE-33262DF1F20E}" dt="2024-04-10T23:35:03.815" v="4036" actId="1035"/>
+          <ac:picMkLst>
+            <pc:docMk/>
+            <pc:sldMk cId="10480317" sldId="289"/>
+            <ac:picMk id="6" creationId="{E4F125B8-D212-51CD-5B45-81833F8D3496}"/>
+          </ac:picMkLst>
+        </pc:picChg>
+        <pc:picChg chg="add mod">
+          <ac:chgData name="Elme Pieterse" userId="cf235864-f06d-4d9c-a838-9d693a8e3248" providerId="ADAL" clId="{44400E0D-F01E-4C52-8DFE-33262DF1F20E}" dt="2024-04-10T23:35:16.227" v="4085" actId="1037"/>
+          <ac:picMkLst>
+            <pc:docMk/>
+            <pc:sldMk cId="10480317" sldId="289"/>
+            <ac:picMk id="9" creationId="{75C8000B-8D19-1CD7-5BA8-E56F5109BBD6}"/>
+          </ac:picMkLst>
+        </pc:picChg>
+        <pc:picChg chg="add mod">
+          <ac:chgData name="Elme Pieterse" userId="cf235864-f06d-4d9c-a838-9d693a8e3248" providerId="ADAL" clId="{44400E0D-F01E-4C52-8DFE-33262DF1F20E}" dt="2024-04-10T23:35:16.227" v="4085" actId="1037"/>
+          <ac:picMkLst>
+            <pc:docMk/>
+            <pc:sldMk cId="10480317" sldId="289"/>
+            <ac:picMk id="11" creationId="{3E8CBDD8-C1A8-F620-0FDE-C4EBBBDE19DC}"/>
+          </ac:picMkLst>
+        </pc:picChg>
+        <pc:picChg chg="add mod">
+          <ac:chgData name="Elme Pieterse" userId="cf235864-f06d-4d9c-a838-9d693a8e3248" providerId="ADAL" clId="{44400E0D-F01E-4C52-8DFE-33262DF1F20E}" dt="2024-04-10T23:35:03.815" v="4036" actId="1035"/>
+          <ac:picMkLst>
+            <pc:docMk/>
+            <pc:sldMk cId="10480317" sldId="289"/>
+            <ac:picMk id="13" creationId="{D4376804-A6C0-86B2-1BE1-CB89CD98E265}"/>
+          </ac:picMkLst>
+        </pc:picChg>
+        <pc:picChg chg="add mod">
+          <ac:chgData name="Elme Pieterse" userId="cf235864-f06d-4d9c-a838-9d693a8e3248" providerId="ADAL" clId="{44400E0D-F01E-4C52-8DFE-33262DF1F20E}" dt="2024-04-10T23:35:03.815" v="4036" actId="1035"/>
+          <ac:picMkLst>
+            <pc:docMk/>
+            <pc:sldMk cId="10480317" sldId="289"/>
+            <ac:picMk id="15" creationId="{A90652A6-240A-B890-A5A4-897498CAF314}"/>
+          </ac:picMkLst>
+        </pc:picChg>
+        <pc:picChg chg="add mod">
+          <ac:chgData name="Elme Pieterse" userId="cf235864-f06d-4d9c-a838-9d693a8e3248" providerId="ADAL" clId="{44400E0D-F01E-4C52-8DFE-33262DF1F20E}" dt="2024-04-10T23:35:03.815" v="4036" actId="1035"/>
+          <ac:picMkLst>
+            <pc:docMk/>
+            <pc:sldMk cId="10480317" sldId="289"/>
+            <ac:picMk id="17" creationId="{C425D4AE-A809-6881-6A38-91D6825586D5}"/>
+          </ac:picMkLst>
+        </pc:picChg>
+        <pc:picChg chg="add mod">
+          <ac:chgData name="Elme Pieterse" userId="cf235864-f06d-4d9c-a838-9d693a8e3248" providerId="ADAL" clId="{44400E0D-F01E-4C52-8DFE-33262DF1F20E}" dt="2024-04-10T23:35:03.815" v="4036" actId="1035"/>
+          <ac:picMkLst>
+            <pc:docMk/>
+            <pc:sldMk cId="10480317" sldId="289"/>
+            <ac:picMk id="19" creationId="{D25CDD86-0A95-20C6-742A-F35AE270BC37}"/>
           </ac:picMkLst>
         </pc:picChg>
         <pc:cxnChg chg="del">
@@ -2605,7 +2661,7 @@
           <a:p>
             <a:fld id="{F37D28C0-BEB6-42B0-A203-EEE1023219C4}" type="datetimeFigureOut">
               <a:rPr lang="en-NZ" smtClean="0"/>
-              <a:t>10/04/2024</a:t>
+              <a:t>11/04/2024</a:t>
             </a:fld>
             <a:endParaRPr lang="en-NZ"/>
           </a:p>
@@ -6148,7 +6204,7 @@
           <a:p>
             <a:fld id="{9C4A4F43-1C06-40E6-8F87-8B286982E50E}" type="datetimeFigureOut">
               <a:rPr lang="en-NZ" smtClean="0"/>
-              <a:t>10/04/2024</a:t>
+              <a:t>11/04/2024</a:t>
             </a:fld>
             <a:endParaRPr lang="en-NZ" dirty="0"/>
           </a:p>
@@ -6348,7 +6404,7 @@
           <a:p>
             <a:fld id="{9C4A4F43-1C06-40E6-8F87-8B286982E50E}" type="datetimeFigureOut">
               <a:rPr lang="en-NZ" smtClean="0"/>
-              <a:t>10/04/2024</a:t>
+              <a:t>11/04/2024</a:t>
             </a:fld>
             <a:endParaRPr lang="en-NZ" dirty="0"/>
           </a:p>
@@ -6558,7 +6614,7 @@
           <a:p>
             <a:fld id="{9C4A4F43-1C06-40E6-8F87-8B286982E50E}" type="datetimeFigureOut">
               <a:rPr lang="en-NZ" smtClean="0"/>
-              <a:t>10/04/2024</a:t>
+              <a:t>11/04/2024</a:t>
             </a:fld>
             <a:endParaRPr lang="en-NZ" dirty="0"/>
           </a:p>
@@ -7117,7 +7173,7 @@
           <a:p>
             <a:fld id="{9C4A4F43-1C06-40E6-8F87-8B286982E50E}" type="datetimeFigureOut">
               <a:rPr lang="en-NZ" smtClean="0"/>
-              <a:t>10/04/2024</a:t>
+              <a:t>11/04/2024</a:t>
             </a:fld>
             <a:endParaRPr lang="en-NZ" dirty="0"/>
           </a:p>
@@ -7393,7 +7449,7 @@
           <a:p>
             <a:fld id="{9C4A4F43-1C06-40E6-8F87-8B286982E50E}" type="datetimeFigureOut">
               <a:rPr lang="en-NZ" smtClean="0"/>
-              <a:t>10/04/2024</a:t>
+              <a:t>11/04/2024</a:t>
             </a:fld>
             <a:endParaRPr lang="en-NZ" dirty="0"/>
           </a:p>
@@ -7661,7 +7717,7 @@
           <a:p>
             <a:fld id="{9C4A4F43-1C06-40E6-8F87-8B286982E50E}" type="datetimeFigureOut">
               <a:rPr lang="en-NZ" smtClean="0"/>
-              <a:t>10/04/2024</a:t>
+              <a:t>11/04/2024</a:t>
             </a:fld>
             <a:endParaRPr lang="en-NZ" dirty="0"/>
           </a:p>
@@ -8076,7 +8132,7 @@
           <a:p>
             <a:fld id="{9C4A4F43-1C06-40E6-8F87-8B286982E50E}" type="datetimeFigureOut">
               <a:rPr lang="en-NZ" smtClean="0"/>
-              <a:t>10/04/2024</a:t>
+              <a:t>11/04/2024</a:t>
             </a:fld>
             <a:endParaRPr lang="en-NZ" dirty="0"/>
           </a:p>
@@ -8218,7 +8274,7 @@
           <a:p>
             <a:fld id="{9C4A4F43-1C06-40E6-8F87-8B286982E50E}" type="datetimeFigureOut">
               <a:rPr lang="en-NZ" smtClean="0"/>
-              <a:t>10/04/2024</a:t>
+              <a:t>11/04/2024</a:t>
             </a:fld>
             <a:endParaRPr lang="en-NZ" dirty="0"/>
           </a:p>
@@ -8331,7 +8387,7 @@
           <a:p>
             <a:fld id="{9C4A4F43-1C06-40E6-8F87-8B286982E50E}" type="datetimeFigureOut">
               <a:rPr lang="en-NZ" smtClean="0"/>
-              <a:t>10/04/2024</a:t>
+              <a:t>11/04/2024</a:t>
             </a:fld>
             <a:endParaRPr lang="en-NZ" dirty="0"/>
           </a:p>
@@ -8644,7 +8700,7 @@
           <a:p>
             <a:fld id="{9C4A4F43-1C06-40E6-8F87-8B286982E50E}" type="datetimeFigureOut">
               <a:rPr lang="en-NZ" smtClean="0"/>
-              <a:t>10/04/2024</a:t>
+              <a:t>11/04/2024</a:t>
             </a:fld>
             <a:endParaRPr lang="en-NZ" dirty="0"/>
           </a:p>
@@ -8933,7 +8989,7 @@
           <a:p>
             <a:fld id="{9C4A4F43-1C06-40E6-8F87-8B286982E50E}" type="datetimeFigureOut">
               <a:rPr lang="en-NZ" smtClean="0"/>
-              <a:t>10/04/2024</a:t>
+              <a:t>11/04/2024</a:t>
             </a:fld>
             <a:endParaRPr lang="en-NZ" dirty="0"/>
           </a:p>
@@ -9176,7 +9232,7 @@
           <a:p>
             <a:fld id="{9C4A4F43-1C06-40E6-8F87-8B286982E50E}" type="datetimeFigureOut">
               <a:rPr lang="en-NZ" smtClean="0"/>
-              <a:t>10/04/2024</a:t>
+              <a:t>11/04/2024</a:t>
             </a:fld>
             <a:endParaRPr lang="en-NZ" dirty="0"/>
           </a:p>
@@ -14516,13 +14572,13 @@
         </p:nvSpPr>
         <p:spPr>
           <a:xfrm>
-            <a:off x="1371597" y="348865"/>
-            <a:ext cx="10044023" cy="877729"/>
+            <a:off x="241298" y="333373"/>
+            <a:ext cx="4038766" cy="877729"/>
           </a:xfrm>
         </p:spPr>
         <p:txBody>
           <a:bodyPr vert="horz" lIns="91440" tIns="45720" rIns="91440" bIns="45720" rtlCol="0" anchor="ctr">
-            <a:normAutofit/>
+            <a:noAutofit/>
           </a:bodyPr>
           <a:lstStyle/>
           <a:p>
@@ -14553,14 +14609,14 @@
           <p:nvPr>
             <p:extLst>
               <p:ext uri="{D42A27DB-BD31-4B8C-83A1-F6EECF244321}">
-                <p14:modId xmlns:p14="http://schemas.microsoft.com/office/powerpoint/2010/main" val="944487902"/>
+                <p14:modId xmlns:p14="http://schemas.microsoft.com/office/powerpoint/2010/main" val="687170815"/>
               </p:ext>
             </p:extLst>
           </p:nvPr>
         </p:nvGraphicFramePr>
         <p:xfrm>
-          <a:off x="202387" y="1716038"/>
-          <a:ext cx="5174815" cy="1388586"/>
+          <a:off x="115888" y="1678967"/>
+          <a:ext cx="4023624" cy="1297146"/>
         </p:xfrm>
         <a:graphic>
           <a:graphicData uri="http://schemas.openxmlformats.org/drawingml/2006/table">
@@ -14569,14 +14625,14 @@
                 <a:noFill/>
               </a:tblPr>
               <a:tblGrid>
-                <a:gridCol w="2845613">
+                <a:gridCol w="2417247">
                   <a:extLst>
                     <a:ext uri="{9D8B030D-6E8A-4147-A177-3AD203B41FA5}">
                       <a16:colId xmlns:a16="http://schemas.microsoft.com/office/drawing/2014/main" val="20000"/>
                     </a:ext>
                   </a:extLst>
                 </a:gridCol>
-                <a:gridCol w="2329202">
+                <a:gridCol w="1606377">
                   <a:extLst>
                     <a:ext uri="{9D8B030D-6E8A-4147-A177-3AD203B41FA5}">
                       <a16:colId xmlns:a16="http://schemas.microsoft.com/office/drawing/2014/main" val="20001"/>
@@ -14600,10 +14656,10 @@
                         <a:buNone/>
                       </a:pPr>
                       <a:r>
-                        <a:rPr lang="en" sz="1200" b="1" dirty="0"/>
+                        <a:rPr lang="en" sz="1000" b="1" dirty="0"/>
                         <a:t>Test Cases – input (Combo Name)</a:t>
                       </a:r>
-                      <a:endParaRPr sz="1200" b="1" dirty="0"/>
+                      <a:endParaRPr sz="1000" b="1" dirty="0"/>
                     </a:p>
                   </a:txBody>
                   <a:tcPr marL="139991" marR="139991" marT="139991" marB="139991">
@@ -14627,10 +14683,10 @@
                         <a:buNone/>
                       </a:pPr>
                       <a:r>
-                        <a:rPr lang="en" sz="1200" b="1" dirty="0"/>
+                        <a:rPr lang="en" sz="1000" b="1" dirty="0"/>
                         <a:t>Expected output</a:t>
                       </a:r>
-                      <a:endParaRPr sz="1200" b="1" dirty="0"/>
+                      <a:endParaRPr sz="1000" b="1" dirty="0"/>
                     </a:p>
                   </a:txBody>
                   <a:tcPr marL="139991" marR="139991" marT="139991" marB="139991">
@@ -14661,7 +14717,7 @@
                         <a:buNone/>
                       </a:pPr>
                       <a:r>
-                        <a:rPr lang="en-NZ" sz="1200" dirty="0"/>
+                        <a:rPr lang="en-NZ" sz="1000" dirty="0"/>
                         <a:t>‘Supreme’ in Combo Name</a:t>
                       </a:r>
                     </a:p>
@@ -14683,7 +14739,7 @@
                         <a:buNone/>
                       </a:pPr>
                       <a:r>
-                        <a:rPr lang="en-NZ" sz="1200" dirty="0"/>
+                        <a:rPr lang="en-NZ" sz="1000" dirty="0"/>
                         <a:t>Program Continues</a:t>
                       </a:r>
                     </a:p>
@@ -14712,7 +14768,7 @@
                         <a:buNone/>
                       </a:pPr>
                       <a:r>
-                        <a:rPr lang="en-NZ" sz="1200" dirty="0"/>
+                        <a:rPr lang="en-NZ" sz="1000" dirty="0"/>
                         <a:t>‘123’ in Combo Name</a:t>
                       </a:r>
                     </a:p>
@@ -14734,7 +14790,7 @@
                         <a:buNone/>
                       </a:pPr>
                       <a:r>
-                        <a:rPr lang="en-NZ" sz="1200" dirty="0"/>
+                        <a:rPr lang="en-NZ" sz="1000" dirty="0"/>
                         <a:t>Program Continues</a:t>
                       </a:r>
                     </a:p>
@@ -14764,14 +14820,14 @@
           <p:nvPr>
             <p:extLst>
               <p:ext uri="{D42A27DB-BD31-4B8C-83A1-F6EECF244321}">
-                <p14:modId xmlns:p14="http://schemas.microsoft.com/office/powerpoint/2010/main" val="4247573327"/>
+                <p14:modId xmlns:p14="http://schemas.microsoft.com/office/powerpoint/2010/main" val="1509708601"/>
               </p:ext>
             </p:extLst>
           </p:nvPr>
         </p:nvGraphicFramePr>
         <p:xfrm>
-          <a:off x="202387" y="3104624"/>
-          <a:ext cx="5174815" cy="1388586"/>
+          <a:off x="115888" y="2968697"/>
+          <a:ext cx="4023625" cy="1297146"/>
         </p:xfrm>
         <a:graphic>
           <a:graphicData uri="http://schemas.openxmlformats.org/drawingml/2006/table">
@@ -14780,14 +14836,14 @@
                 <a:noFill/>
               </a:tblPr>
               <a:tblGrid>
-                <a:gridCol w="2845613">
+                <a:gridCol w="2417247">
                   <a:extLst>
                     <a:ext uri="{9D8B030D-6E8A-4147-A177-3AD203B41FA5}">
                       <a16:colId xmlns:a16="http://schemas.microsoft.com/office/drawing/2014/main" val="20000"/>
                     </a:ext>
                   </a:extLst>
                 </a:gridCol>
-                <a:gridCol w="2329202">
+                <a:gridCol w="1606378">
                   <a:extLst>
                     <a:ext uri="{9D8B030D-6E8A-4147-A177-3AD203B41FA5}">
                       <a16:colId xmlns:a16="http://schemas.microsoft.com/office/drawing/2014/main" val="20001"/>
@@ -14811,10 +14867,10 @@
                         <a:buNone/>
                       </a:pPr>
                       <a:r>
-                        <a:rPr lang="en" sz="1200" b="1" dirty="0"/>
+                        <a:rPr lang="en" sz="1000" b="1" dirty="0"/>
                         <a:t>Test Cases – input (For any 3 Items)</a:t>
                       </a:r>
-                      <a:endParaRPr sz="1200" b="1" dirty="0"/>
+                      <a:endParaRPr sz="1000" b="1" dirty="0"/>
                     </a:p>
                   </a:txBody>
                   <a:tcPr marL="139991" marR="139991" marT="139991" marB="139991">
@@ -14838,10 +14894,10 @@
                         <a:buNone/>
                       </a:pPr>
                       <a:r>
-                        <a:rPr lang="en" sz="1200" b="1" dirty="0"/>
+                        <a:rPr lang="en" sz="1000" b="1" dirty="0"/>
                         <a:t>Expected output</a:t>
                       </a:r>
-                      <a:endParaRPr sz="1200" b="1" dirty="0"/>
+                      <a:endParaRPr sz="1000" b="1" dirty="0"/>
                     </a:p>
                   </a:txBody>
                   <a:tcPr marL="139991" marR="139991" marT="139991" marB="139991">
@@ -14872,7 +14928,7 @@
                         <a:buNone/>
                       </a:pPr>
                       <a:r>
-                        <a:rPr lang="en-NZ" sz="1200" dirty="0"/>
+                        <a:rPr lang="en-NZ" sz="1000" dirty="0"/>
                         <a:t>‘Pork Burger’</a:t>
                       </a:r>
                     </a:p>
@@ -14894,7 +14950,7 @@
                         <a:buNone/>
                       </a:pPr>
                       <a:r>
-                        <a:rPr lang="en-NZ" sz="1200" dirty="0"/>
+                        <a:rPr lang="en-NZ" sz="1000" dirty="0"/>
                         <a:t>Program Continues</a:t>
                       </a:r>
                     </a:p>
@@ -14923,7 +14979,7 @@
                         <a:buNone/>
                       </a:pPr>
                       <a:r>
-                        <a:rPr lang="en-NZ" sz="1200" dirty="0"/>
+                        <a:rPr lang="en-NZ" sz="1000" dirty="0"/>
                         <a:t>‘123’</a:t>
                       </a:r>
                     </a:p>
@@ -14945,7 +15001,7 @@
                         <a:buNone/>
                       </a:pPr>
                       <a:r>
-                        <a:rPr lang="en-NZ" sz="1200" dirty="0"/>
+                        <a:rPr lang="en-NZ" sz="1000" dirty="0"/>
                         <a:t>Program Continues</a:t>
                       </a:r>
                     </a:p>
@@ -14975,14 +15031,14 @@
           <p:nvPr>
             <p:extLst>
               <p:ext uri="{D42A27DB-BD31-4B8C-83A1-F6EECF244321}">
-                <p14:modId xmlns:p14="http://schemas.microsoft.com/office/powerpoint/2010/main" val="972505143"/>
+                <p14:modId xmlns:p14="http://schemas.microsoft.com/office/powerpoint/2010/main" val="2792436559"/>
               </p:ext>
             </p:extLst>
           </p:nvPr>
         </p:nvGraphicFramePr>
         <p:xfrm>
-          <a:off x="202386" y="4493210"/>
-          <a:ext cx="5174815" cy="2034328"/>
+          <a:off x="115887" y="4258430"/>
+          <a:ext cx="4023624" cy="2034328"/>
         </p:xfrm>
         <a:graphic>
           <a:graphicData uri="http://schemas.openxmlformats.org/drawingml/2006/table">
@@ -14991,14 +15047,14 @@
                 <a:noFill/>
               </a:tblPr>
               <a:tblGrid>
-                <a:gridCol w="2845614">
+                <a:gridCol w="2400288">
                   <a:extLst>
                     <a:ext uri="{9D8B030D-6E8A-4147-A177-3AD203B41FA5}">
                       <a16:colId xmlns:a16="http://schemas.microsoft.com/office/drawing/2014/main" val="20000"/>
                     </a:ext>
                   </a:extLst>
                 </a:gridCol>
-                <a:gridCol w="2329201">
+                <a:gridCol w="1623336">
                   <a:extLst>
                     <a:ext uri="{9D8B030D-6E8A-4147-A177-3AD203B41FA5}">
                       <a16:colId xmlns:a16="http://schemas.microsoft.com/office/drawing/2014/main" val="20001"/>
@@ -15022,10 +15078,10 @@
                         <a:buNone/>
                       </a:pPr>
                       <a:r>
-                        <a:rPr lang="en" sz="1200" b="1" dirty="0"/>
+                        <a:rPr lang="en" sz="1000" b="1" dirty="0"/>
                         <a:t>Test Cases – input (For any 3 items price)</a:t>
                       </a:r>
-                      <a:endParaRPr sz="1200" b="1" dirty="0"/>
+                      <a:endParaRPr sz="1000" b="1" dirty="0"/>
                     </a:p>
                   </a:txBody>
                   <a:tcPr marL="139991" marR="139991" marT="139991" marB="139991">
@@ -15049,10 +15105,10 @@
                         <a:buNone/>
                       </a:pPr>
                       <a:r>
-                        <a:rPr lang="en" sz="1200" b="1" dirty="0"/>
+                        <a:rPr lang="en" sz="1000" b="1" dirty="0"/>
                         <a:t>Expected output</a:t>
                       </a:r>
-                      <a:endParaRPr sz="1200" b="1" dirty="0"/>
+                      <a:endParaRPr sz="1000" b="1" dirty="0"/>
                     </a:p>
                   </a:txBody>
                   <a:tcPr marL="139991" marR="139991" marT="139991" marB="139991">
@@ -15067,7 +15123,7 @@
                   </a:ext>
                 </a:extLst>
               </a:tr>
-              <a:tr h="315939">
+              <a:tr h="427891">
                 <a:tc>
                   <a:txBody>
                     <a:bodyPr/>
@@ -15083,7 +15139,7 @@
                         <a:buNone/>
                       </a:pPr>
                       <a:r>
-                        <a:rPr lang="en-NZ" sz="1200" dirty="0"/>
+                        <a:rPr lang="en-NZ" sz="1000" dirty="0"/>
                         <a:t>‘2.45’ in price 1</a:t>
                       </a:r>
                     </a:p>
@@ -15105,7 +15161,7 @@
                         <a:buNone/>
                       </a:pPr>
                       <a:r>
-                        <a:rPr lang="en-NZ" sz="1200" dirty="0"/>
+                        <a:rPr lang="en-NZ" sz="1000" dirty="0"/>
                         <a:t>Program Continues</a:t>
                       </a:r>
                     </a:p>
@@ -15134,10 +15190,9 @@
                         <a:buNone/>
                       </a:pPr>
                       <a:r>
-                        <a:rPr lang="en-NZ" sz="1200"/>
+                        <a:rPr lang="en-NZ" sz="1000" dirty="0"/>
                         <a:t>‘1’ in price 1</a:t>
                       </a:r>
-                      <a:endParaRPr lang="en-NZ" sz="1200" dirty="0"/>
                     </a:p>
                   </a:txBody>
                   <a:tcPr marL="139991" marR="139991" marT="139991" marB="139991"/>
@@ -15157,7 +15212,7 @@
                         <a:buNone/>
                       </a:pPr>
                       <a:r>
-                        <a:rPr lang="en-NZ" sz="1200" dirty="0"/>
+                        <a:rPr lang="en-NZ" sz="1000" dirty="0"/>
                         <a:t>Program Continues</a:t>
                       </a:r>
                     </a:p>
@@ -15186,7 +15241,7 @@
                         <a:buNone/>
                       </a:pPr>
                       <a:r>
-                        <a:rPr lang="en-NZ" sz="1200" dirty="0"/>
+                        <a:rPr lang="en-NZ" sz="1000" dirty="0"/>
                         <a:t>‘five’</a:t>
                       </a:r>
                     </a:p>
@@ -15208,7 +15263,7 @@
                         <a:buNone/>
                       </a:pPr>
                       <a:r>
-                        <a:rPr lang="en-NZ" sz="1200" dirty="0"/>
+                        <a:rPr lang="en-NZ" sz="1000" dirty="0"/>
                         <a:t>It must be an integer. </a:t>
                       </a:r>
                     </a:p>
@@ -15223,7 +15278,7 @@
                         <a:buNone/>
                       </a:pPr>
                       <a:r>
-                        <a:rPr lang="en-NZ" sz="1200" dirty="0"/>
+                        <a:rPr lang="en-NZ" sz="1000" dirty="0"/>
                         <a:t>Please enter a price</a:t>
                       </a:r>
                     </a:p>
@@ -15240,6 +15295,216 @@
           </a:graphicData>
         </a:graphic>
       </p:graphicFrame>
+      <p:pic>
+        <p:nvPicPr>
+          <p:cNvPr id="6" name="Picture 5">
+            <a:extLst>
+              <a:ext uri="{FF2B5EF4-FFF2-40B4-BE49-F238E27FC236}">
+                <a16:creationId xmlns:a16="http://schemas.microsoft.com/office/drawing/2014/main" id="{E4F125B8-D212-51CD-5B45-81833F8D3496}"/>
+              </a:ext>
+            </a:extLst>
+          </p:cNvPr>
+          <p:cNvPicPr>
+            <a:picLocks noChangeAspect="1"/>
+          </p:cNvPicPr>
+          <p:nvPr/>
+        </p:nvPicPr>
+        <p:blipFill>
+          <a:blip r:embed="rId3"/>
+          <a:stretch>
+            <a:fillRect/>
+          </a:stretch>
+        </p:blipFill>
+        <p:spPr>
+          <a:xfrm>
+            <a:off x="4280063" y="180367"/>
+            <a:ext cx="2244305" cy="969132"/>
+          </a:xfrm>
+          <a:prstGeom prst="rect">
+            <a:avLst/>
+          </a:prstGeom>
+        </p:spPr>
+      </p:pic>
+      <p:pic>
+        <p:nvPicPr>
+          <p:cNvPr id="9" name="Picture 8">
+            <a:extLst>
+              <a:ext uri="{FF2B5EF4-FFF2-40B4-BE49-F238E27FC236}">
+                <a16:creationId xmlns:a16="http://schemas.microsoft.com/office/drawing/2014/main" id="{75C8000B-8D19-1CD7-5BA8-E56F5109BBD6}"/>
+              </a:ext>
+            </a:extLst>
+          </p:cNvPr>
+          <p:cNvPicPr>
+            <a:picLocks noChangeAspect="1"/>
+          </p:cNvPicPr>
+          <p:nvPr/>
+        </p:nvPicPr>
+        <p:blipFill>
+          <a:blip r:embed="rId4"/>
+          <a:stretch>
+            <a:fillRect/>
+          </a:stretch>
+        </p:blipFill>
+        <p:spPr>
+          <a:xfrm>
+            <a:off x="9806406" y="167667"/>
+            <a:ext cx="2244306" cy="919423"/>
+          </a:xfrm>
+          <a:prstGeom prst="rect">
+            <a:avLst/>
+          </a:prstGeom>
+        </p:spPr>
+      </p:pic>
+      <p:pic>
+        <p:nvPicPr>
+          <p:cNvPr id="11" name="Picture 10">
+            <a:extLst>
+              <a:ext uri="{FF2B5EF4-FFF2-40B4-BE49-F238E27FC236}">
+                <a16:creationId xmlns:a16="http://schemas.microsoft.com/office/drawing/2014/main" id="{3E8CBDD8-C1A8-F620-0FDE-C4EBBBDE19DC}"/>
+              </a:ext>
+            </a:extLst>
+          </p:cNvPr>
+          <p:cNvPicPr>
+            <a:picLocks noChangeAspect="1"/>
+          </p:cNvPicPr>
+          <p:nvPr/>
+        </p:nvPicPr>
+        <p:blipFill>
+          <a:blip r:embed="rId5"/>
+          <a:stretch>
+            <a:fillRect/>
+          </a:stretch>
+        </p:blipFill>
+        <p:spPr>
+          <a:xfrm>
+            <a:off x="9806406" y="1087090"/>
+            <a:ext cx="2244305" cy="931813"/>
+          </a:xfrm>
+          <a:prstGeom prst="rect">
+            <a:avLst/>
+          </a:prstGeom>
+        </p:spPr>
+      </p:pic>
+      <p:pic>
+        <p:nvPicPr>
+          <p:cNvPr id="13" name="Picture 12">
+            <a:extLst>
+              <a:ext uri="{FF2B5EF4-FFF2-40B4-BE49-F238E27FC236}">
+                <a16:creationId xmlns:a16="http://schemas.microsoft.com/office/drawing/2014/main" id="{D4376804-A6C0-86B2-1BE1-CB89CD98E265}"/>
+              </a:ext>
+            </a:extLst>
+          </p:cNvPr>
+          <p:cNvPicPr>
+            <a:picLocks noChangeAspect="1"/>
+          </p:cNvPicPr>
+          <p:nvPr/>
+        </p:nvPicPr>
+        <p:blipFill>
+          <a:blip r:embed="rId6"/>
+          <a:stretch>
+            <a:fillRect/>
+          </a:stretch>
+        </p:blipFill>
+        <p:spPr>
+          <a:xfrm>
+            <a:off x="4286670" y="1149499"/>
+            <a:ext cx="2244304" cy="931813"/>
+          </a:xfrm>
+          <a:prstGeom prst="rect">
+            <a:avLst/>
+          </a:prstGeom>
+        </p:spPr>
+      </p:pic>
+      <p:pic>
+        <p:nvPicPr>
+          <p:cNvPr id="15" name="Picture 14">
+            <a:extLst>
+              <a:ext uri="{FF2B5EF4-FFF2-40B4-BE49-F238E27FC236}">
+                <a16:creationId xmlns:a16="http://schemas.microsoft.com/office/drawing/2014/main" id="{A90652A6-240A-B890-A5A4-897498CAF314}"/>
+              </a:ext>
+            </a:extLst>
+          </p:cNvPr>
+          <p:cNvPicPr>
+            <a:picLocks noChangeAspect="1"/>
+          </p:cNvPicPr>
+          <p:nvPr/>
+        </p:nvPicPr>
+        <p:blipFill>
+          <a:blip r:embed="rId7"/>
+          <a:stretch>
+            <a:fillRect/>
+          </a:stretch>
+        </p:blipFill>
+        <p:spPr>
+          <a:xfrm>
+            <a:off x="4280063" y="2078098"/>
+            <a:ext cx="2244305" cy="938944"/>
+          </a:xfrm>
+          <a:prstGeom prst="rect">
+            <a:avLst/>
+          </a:prstGeom>
+        </p:spPr>
+      </p:pic>
+      <p:pic>
+        <p:nvPicPr>
+          <p:cNvPr id="17" name="Picture 16">
+            <a:extLst>
+              <a:ext uri="{FF2B5EF4-FFF2-40B4-BE49-F238E27FC236}">
+                <a16:creationId xmlns:a16="http://schemas.microsoft.com/office/drawing/2014/main" id="{C425D4AE-A809-6881-6A38-91D6825586D5}"/>
+              </a:ext>
+            </a:extLst>
+          </p:cNvPr>
+          <p:cNvPicPr>
+            <a:picLocks noChangeAspect="1"/>
+          </p:cNvPicPr>
+          <p:nvPr/>
+        </p:nvPicPr>
+        <p:blipFill>
+          <a:blip r:embed="rId8"/>
+          <a:stretch>
+            <a:fillRect/>
+          </a:stretch>
+        </p:blipFill>
+        <p:spPr>
+          <a:xfrm>
+            <a:off x="4286670" y="3017042"/>
+            <a:ext cx="2244304" cy="917337"/>
+          </a:xfrm>
+          <a:prstGeom prst="rect">
+            <a:avLst/>
+          </a:prstGeom>
+        </p:spPr>
+      </p:pic>
+      <p:pic>
+        <p:nvPicPr>
+          <p:cNvPr id="19" name="Picture 18">
+            <a:extLst>
+              <a:ext uri="{FF2B5EF4-FFF2-40B4-BE49-F238E27FC236}">
+                <a16:creationId xmlns:a16="http://schemas.microsoft.com/office/drawing/2014/main" id="{D25CDD86-0A95-20C6-742A-F35AE270BC37}"/>
+              </a:ext>
+            </a:extLst>
+          </p:cNvPr>
+          <p:cNvPicPr>
+            <a:picLocks noChangeAspect="1"/>
+          </p:cNvPicPr>
+          <p:nvPr/>
+        </p:nvPicPr>
+        <p:blipFill>
+          <a:blip r:embed="rId9"/>
+          <a:stretch>
+            <a:fillRect/>
+          </a:stretch>
+        </p:blipFill>
+        <p:spPr>
+          <a:xfrm>
+            <a:off x="4280063" y="3943774"/>
+            <a:ext cx="2244304" cy="934177"/>
+          </a:xfrm>
+          <a:prstGeom prst="rect">
+            <a:avLst/>
+          </a:prstGeom>
+        </p:spPr>
+      </p:pic>
     </p:spTree>
     <p:extLst>
       <p:ext uri="{BB962C8B-B14F-4D97-AF65-F5344CB8AC3E}">
@@ -31134,15 +31399,6 @@
 </file>
 
 <file path=customXml/item2.xml><?xml version="1.0" encoding="utf-8"?>
-<?mso-contentType ?>
-<FormTemplates xmlns="http://schemas.microsoft.com/sharepoint/v3/contenttype/forms">
-  <Display>DocumentLibraryForm</Display>
-  <Edit>DocumentLibraryForm</Edit>
-  <New>DocumentLibraryForm</New>
-</FormTemplates>
-</file>
-
-<file path=customXml/item3.xml><?xml version="1.0" encoding="utf-8"?>
 <ct:contentTypeSchema xmlns:ct="http://schemas.microsoft.com/office/2006/metadata/contentType" xmlns:ma="http://schemas.microsoft.com/office/2006/metadata/properties/metaAttributes" ct:_="" ma:_="" ma:contentTypeName="Document" ma:contentTypeID="0x010100CF1FA5F42E32064EBC712696EE2EC419" ma:contentTypeVersion="1" ma:contentTypeDescription="Create a new document." ma:contentTypeScope="" ma:versionID="8da24ec2fec523de482f60ce898ffe29">
   <xsd:schema xmlns:xsd="http://www.w3.org/2001/XMLSchema" xmlns:xs="http://www.w3.org/2001/XMLSchema" xmlns:p="http://schemas.microsoft.com/office/2006/metadata/properties" xmlns:ns2="e38b8155-5114-47b0-a9fa-eb229fbfe015" targetNamespace="http://schemas.microsoft.com/office/2006/metadata/properties" ma:root="true" ma:fieldsID="1e3f358edf1a5d679493ec63a22a5273" ns2:_="">
     <xsd:import namespace="e38b8155-5114-47b0-a9fa-eb229fbfe015"/>
@@ -31268,6 +31524,15 @@
 </ct:contentTypeSchema>
 </file>
 
+<file path=customXml/item3.xml><?xml version="1.0" encoding="utf-8"?>
+<?mso-contentType ?>
+<FormTemplates xmlns="http://schemas.microsoft.com/sharepoint/v3/contenttype/forms">
+  <Display>DocumentLibraryForm</Display>
+  <Edit>DocumentLibraryForm</Edit>
+  <New>DocumentLibraryForm</New>
+</FormTemplates>
+</file>
+
 <file path=customXml/itemProps1.xml><?xml version="1.0" encoding="utf-8"?>
 <ds:datastoreItem xmlns:ds="http://schemas.openxmlformats.org/officeDocument/2006/customXml" ds:itemID="{4FFAE7E7-FE1A-4850-8CF7-E7567E9AC997}">
   <ds:schemaRefs>
@@ -31285,14 +31550,6 @@
 </file>
 
 <file path=customXml/itemProps2.xml><?xml version="1.0" encoding="utf-8"?>
-<ds:datastoreItem xmlns:ds="http://schemas.openxmlformats.org/officeDocument/2006/customXml" ds:itemID="{850509B3-B737-4CBB-82EF-E3EDD3E90B92}">
-  <ds:schemaRefs>
-    <ds:schemaRef ds:uri="http://schemas.microsoft.com/sharepoint/v3/contenttype/forms"/>
-  </ds:schemaRefs>
-</ds:datastoreItem>
-</file>
-
-<file path=customXml/itemProps3.xml><?xml version="1.0" encoding="utf-8"?>
 <ds:datastoreItem xmlns:ds="http://schemas.openxmlformats.org/officeDocument/2006/customXml" ds:itemID="{3E4F6013-939F-44FC-9DE4-A98A0DBD5543}">
   <ds:schemaRefs>
     <ds:schemaRef ds:uri="http://schemas.microsoft.com/office/2006/metadata/contentType"/>
@@ -31308,4 +31565,12 @@
     <ds:schemaRef ds:uri="http://schemas.microsoft.com/internal/obd"/>
   </ds:schemaRefs>
 </ds:datastoreItem>
+</file>
+
+<file path=customXml/itemProps3.xml><?xml version="1.0" encoding="utf-8"?>
+<ds:datastoreItem xmlns:ds="http://schemas.openxmlformats.org/officeDocument/2006/customXml" ds:itemID="{850509B3-B737-4CBB-82EF-E3EDD3E90B92}">
+  <ds:schemaRefs>
+    <ds:schemaRef ds:uri="http://schemas.microsoft.com/sharepoint/v3/contenttype/forms"/>
+  </ds:schemaRefs>
+</ds:datastoreItem>
 </file>
</xml_diff>